<commit_message>
DevSecOpsPipeline image and ppt
</commit_message>
<xml_diff>
--- a/starter/DevOpsPipeline.pptx
+++ b/starter/DevOpsPipeline.pptx
@@ -5623,7 +5623,7 @@
         </p:nvSpPr>
         <p:spPr>
           <a:xfrm>
-            <a:off x="5282020" y="214528"/>
+            <a:off x="5282020" y="804248"/>
             <a:ext cx="1232035" cy="597600"/>
           </a:xfrm>
           <a:prstGeom prst="rect">
@@ -5667,7 +5667,7 @@
         </p:nvSpPr>
         <p:spPr>
           <a:xfrm>
-            <a:off x="3145648" y="224896"/>
+            <a:off x="3145648" y="814616"/>
             <a:ext cx="1308000" cy="597600"/>
           </a:xfrm>
           <a:prstGeom prst="rect">
@@ -6170,7 +6170,7 @@
         </p:blipFill>
         <p:spPr bwMode="auto">
           <a:xfrm>
-            <a:off x="7065369" y="925288"/>
+            <a:off x="7065369" y="1515008"/>
             <a:ext cx="400453" cy="459568"/>
           </a:xfrm>
           <a:prstGeom prst="rect">
@@ -6202,7 +6202,7 @@
         </p:nvSpPr>
         <p:spPr>
           <a:xfrm>
-            <a:off x="7230218" y="221154"/>
+            <a:off x="7230218" y="810874"/>
             <a:ext cx="1232035" cy="597600"/>
           </a:xfrm>
           <a:prstGeom prst="rect">
@@ -6255,7 +6255,7 @@
         </p:nvCxnSpPr>
         <p:spPr>
           <a:xfrm flipV="1">
-            <a:off x="4453648" y="513328"/>
+            <a:off x="4453648" y="1103048"/>
             <a:ext cx="828372" cy="10368"/>
           </a:xfrm>
           <a:prstGeom prst="straightConnector1">
@@ -6297,7 +6297,7 @@
         </p:nvCxnSpPr>
         <p:spPr>
           <a:xfrm>
-            <a:off x="6514055" y="513328"/>
+            <a:off x="6514055" y="1103048"/>
             <a:ext cx="716163" cy="6626"/>
           </a:xfrm>
           <a:prstGeom prst="straightConnector1">
@@ -6351,7 +6351,7 @@
         </p:blipFill>
         <p:spPr bwMode="auto">
           <a:xfrm>
-            <a:off x="8277878" y="925288"/>
+            <a:off x="8277878" y="1515008"/>
             <a:ext cx="349445" cy="401030"/>
           </a:xfrm>
           <a:prstGeom prst="rect">
@@ -6398,7 +6398,7 @@
         </p:blipFill>
         <p:spPr bwMode="auto">
           <a:xfrm>
-            <a:off x="7665455" y="925289"/>
+            <a:off x="7665455" y="1515009"/>
             <a:ext cx="349462" cy="349462"/>
           </a:xfrm>
           <a:prstGeom prst="rect">
@@ -6537,7 +6537,7 @@
         </p:blipFill>
         <p:spPr bwMode="auto">
           <a:xfrm>
-            <a:off x="5771984" y="894025"/>
+            <a:off x="5771984" y="1483745"/>
             <a:ext cx="418925" cy="418925"/>
           </a:xfrm>
           <a:prstGeom prst="rect">
@@ -6758,7 +6758,7 @@
         </p:nvSpPr>
         <p:spPr>
           <a:xfrm>
-            <a:off x="7301948" y="1343159"/>
+            <a:off x="7301948" y="1932879"/>
             <a:ext cx="1121240" cy="584775"/>
           </a:xfrm>
           <a:prstGeom prst="rect">
@@ -7073,8 +7073,8 @@
         </p:nvCxnSpPr>
         <p:spPr>
           <a:xfrm flipV="1">
-            <a:off x="3799648" y="822496"/>
-            <a:ext cx="0" cy="1759379"/>
+            <a:off x="3799648" y="1412216"/>
+            <a:ext cx="0" cy="1169659"/>
           </a:xfrm>
           <a:prstGeom prst="straightConnector1">
             <a:avLst/>
@@ -7120,6 +7120,52 @@
           </a:xfrm>
           <a:prstGeom prst="bentConnector3">
             <a:avLst/>
+          </a:prstGeom>
+          <a:ln>
+            <a:tailEnd type="triangle"/>
+          </a:ln>
+        </p:spPr>
+        <p:style>
+          <a:lnRef idx="1">
+            <a:schemeClr val="accent1"/>
+          </a:lnRef>
+          <a:fillRef idx="0">
+            <a:schemeClr val="accent1"/>
+          </a:fillRef>
+          <a:effectRef idx="0">
+            <a:schemeClr val="accent1"/>
+          </a:effectRef>
+          <a:fontRef idx="minor">
+            <a:schemeClr val="tx1"/>
+          </a:fontRef>
+        </p:style>
+      </p:cxnSp>
+      <p:cxnSp>
+        <p:nvCxnSpPr>
+          <p:cNvPr id="5" name="Conector: Angulado 4">
+            <a:extLst>
+              <a:ext uri="{FF2B5EF4-FFF2-40B4-BE49-F238E27FC236}">
+                <a16:creationId xmlns:a16="http://schemas.microsoft.com/office/drawing/2014/main" id="{552A6465-020E-49C6-B490-8C40FBD4E544}"/>
+              </a:ext>
+            </a:extLst>
+          </p:cNvPr>
+          <p:cNvCxnSpPr>
+            <a:cxnSpLocks/>
+            <a:stCxn id="51" idx="0"/>
+            <a:endCxn id="57" idx="1"/>
+          </p:cNvCxnSpPr>
+          <p:nvPr/>
+        </p:nvCxnSpPr>
+        <p:spPr>
+          <a:xfrm rot="16200000" flipH="1" flipV="1">
+            <a:off x="3035026" y="-1925778"/>
+            <a:ext cx="2074559" cy="7547861"/>
+          </a:xfrm>
+          <a:prstGeom prst="bentConnector4">
+            <a:avLst>
+              <a:gd name="adj1" fmla="val -17407"/>
+              <a:gd name="adj2" fmla="val 103029"/>
+            </a:avLst>
           </a:prstGeom>
           <a:ln>
             <a:tailEnd type="triangle"/>

</xml_diff>